<commit_message>
some changes to 2dnew
</commit_message>
<xml_diff>
--- a/BP/BP-ICAM 24 Mar 2021.pptx
+++ b/BP/BP-ICAM 24 Mar 2021.pptx
@@ -17,6 +17,7 @@
     <p:sldId id="263" r:id="rId12"/>
     <p:sldId id="264" r:id="rId13"/>
     <p:sldId id="265" r:id="rId14"/>
+    <p:sldId id="266" r:id="rId15"/>
   </p:sldIdLst>
   <p:sldSz cx="12192000" cy="6858000"/>
   <p:notesSz cx="7772400" cy="10058400"/>
@@ -4586,19 +4587,7 @@
               <a:rPr b="0" lang="en-GB" sz="4400" spc="-1" strike="noStrike">
                 <a:latin typeface="Arial"/>
               </a:rPr>
-              <a:t>Click to edit </a:t>
-            </a:r>
-            <a:r>
-              <a:rPr b="0" lang="en-GB" sz="4400" spc="-1" strike="noStrike">
-                <a:latin typeface="Arial"/>
-              </a:rPr>
-              <a:t>the title text </a:t>
-            </a:r>
-            <a:r>
-              <a:rPr b="0" lang="en-GB" sz="4400" spc="-1" strike="noStrike">
-                <a:latin typeface="Arial"/>
-              </a:rPr>
-              <a:t>format</a:t>
+              <a:t>Click to edit the title text format</a:t>
             </a:r>
             <a:endParaRPr b="0" lang="en-GB" sz="4400" spc="-1" strike="noStrike">
               <a:latin typeface="Arial"/>
@@ -4831,7 +4820,7 @@
         <p:spPr>
           <a:xfrm>
             <a:off x="7934400" y="5528160"/>
-            <a:ext cx="3621240" cy="806760"/>
+            <a:ext cx="3620880" cy="806400"/>
           </a:xfrm>
           <a:prstGeom prst="rect">
             <a:avLst/>
@@ -4900,7 +4889,7 @@
         <p:spPr>
           <a:xfrm>
             <a:off x="540000" y="5312160"/>
-            <a:ext cx="2522520" cy="1022760"/>
+            <a:ext cx="2522160" cy="1022400"/>
           </a:xfrm>
           <a:prstGeom prst="rect">
             <a:avLst/>
@@ -4953,7 +4942,7 @@
         <p:spPr>
           <a:xfrm>
             <a:off x="5040360" y="1431720"/>
-            <a:ext cx="1747080" cy="2303640"/>
+            <a:ext cx="1746720" cy="2303280"/>
           </a:xfrm>
           <a:prstGeom prst="rect">
             <a:avLst/>
@@ -4972,9 +4961,9 @@
         <p:grpSpPr>
           <a:xfrm>
             <a:off x="540000" y="1657800"/>
-            <a:ext cx="3275640" cy="1851480"/>
+            <a:ext cx="3275280" cy="1851120"/>
             <a:chOff x="540000" y="1657800"/>
-            <a:chExt cx="3275640" cy="1851480"/>
+            <a:chExt cx="3275280" cy="1851120"/>
           </a:xfrm>
         </p:grpSpPr>
         <p:pic>
@@ -4990,7 +4979,7 @@
           <p:spPr>
             <a:xfrm>
               <a:off x="540000" y="2664720"/>
-              <a:ext cx="2098800" cy="844560"/>
+              <a:ext cx="2098440" cy="844200"/>
             </a:xfrm>
             <a:prstGeom prst="rect">
               <a:avLst/>
@@ -5013,7 +5002,7 @@
           <p:spPr>
             <a:xfrm>
               <a:off x="540000" y="1657800"/>
-              <a:ext cx="3275640" cy="817200"/>
+              <a:ext cx="3275280" cy="816840"/>
             </a:xfrm>
             <a:prstGeom prst="rect">
               <a:avLst/>
@@ -5037,7 +5026,7 @@
         <p:spPr>
           <a:xfrm>
             <a:off x="8011800" y="1733760"/>
-            <a:ext cx="3003840" cy="1699920"/>
+            <a:ext cx="3003480" cy="1699560"/>
           </a:xfrm>
           <a:prstGeom prst="rect">
             <a:avLst/>
@@ -5056,7 +5045,7 @@
         <p:spPr>
           <a:xfrm>
             <a:off x="4833360" y="6215040"/>
-            <a:ext cx="2524680" cy="471960"/>
+            <a:ext cx="2524320" cy="471600"/>
           </a:xfrm>
           <a:prstGeom prst="rect">
             <a:avLst/>
@@ -5171,7 +5160,7 @@
         <p:spPr>
           <a:xfrm>
             <a:off x="5000400" y="4520520"/>
-            <a:ext cx="2190960" cy="455760"/>
+            <a:ext cx="2190600" cy="455400"/>
           </a:xfrm>
           <a:prstGeom prst="rect">
             <a:avLst/>
@@ -5269,7 +5258,7 @@
         <p:spPr>
           <a:xfrm>
             <a:off x="7925040" y="1531440"/>
-            <a:ext cx="3414960" cy="3381840"/>
+            <a:ext cx="3414600" cy="3381480"/>
           </a:xfrm>
           <a:prstGeom prst="rect">
             <a:avLst/>
@@ -5324,7 +5313,7 @@
             </a:endParaRPr>
           </a:p>
           <a:p>
-            <a:pPr marL="285840" indent="-283680">
+            <a:pPr marL="285840" indent="-283320">
               <a:lnSpc>
                 <a:spcPct val="100000"/>
               </a:lnSpc>
@@ -5352,7 +5341,7 @@
             </a:endParaRPr>
           </a:p>
           <a:p>
-            <a:pPr marL="285840" indent="-283680">
+            <a:pPr marL="285840" indent="-283320">
               <a:lnSpc>
                 <a:spcPct val="100000"/>
               </a:lnSpc>
@@ -5380,7 +5369,7 @@
             </a:endParaRPr>
           </a:p>
           <a:p>
-            <a:pPr marL="285840" indent="-283680">
+            <a:pPr marL="285840" indent="-283320">
               <a:lnSpc>
                 <a:spcPct val="100000"/>
               </a:lnSpc>
@@ -5408,7 +5397,7 @@
             </a:endParaRPr>
           </a:p>
           <a:p>
-            <a:pPr marL="285840" indent="-283680">
+            <a:pPr marL="285840" indent="-283320">
               <a:lnSpc>
                 <a:spcPct val="100000"/>
               </a:lnSpc>
@@ -5474,7 +5463,7 @@
         <p:spPr>
           <a:xfrm>
             <a:off x="388440" y="333720"/>
-            <a:ext cx="1360080" cy="359640"/>
+            <a:ext cx="1359720" cy="359280"/>
           </a:xfrm>
           <a:prstGeom prst="rect">
             <a:avLst/>
@@ -5497,7 +5486,7 @@
         <p:spPr>
           <a:xfrm>
             <a:off x="10336680" y="334800"/>
-            <a:ext cx="985680" cy="1273680"/>
+            <a:ext cx="985320" cy="1273320"/>
           </a:xfrm>
           <a:prstGeom prst="rect">
             <a:avLst/>
@@ -5516,7 +5505,7 @@
         <p:spPr>
           <a:xfrm>
             <a:off x="638280" y="1531440"/>
-            <a:ext cx="3348360" cy="2833200"/>
+            <a:ext cx="3348000" cy="2832840"/>
           </a:xfrm>
           <a:prstGeom prst="rect">
             <a:avLst/>
@@ -5571,7 +5560,7 @@
             </a:endParaRPr>
           </a:p>
           <a:p>
-            <a:pPr marL="285840" indent="-283680">
+            <a:pPr marL="285840" indent="-283320">
               <a:lnSpc>
                 <a:spcPct val="100000"/>
               </a:lnSpc>
@@ -5599,7 +5588,7 @@
             </a:endParaRPr>
           </a:p>
           <a:p>
-            <a:pPr marL="285840" indent="-283680">
+            <a:pPr marL="285840" indent="-283320">
               <a:lnSpc>
                 <a:spcPct val="100000"/>
               </a:lnSpc>
@@ -5627,7 +5616,7 @@
             </a:endParaRPr>
           </a:p>
           <a:p>
-            <a:pPr marL="285840" indent="-283680">
+            <a:pPr marL="285840" indent="-283320">
               <a:lnSpc>
                 <a:spcPct val="100000"/>
               </a:lnSpc>
@@ -5704,7 +5693,7 @@
         <p:spPr>
           <a:xfrm>
             <a:off x="4140000" y="1531440"/>
-            <a:ext cx="3348360" cy="2833200"/>
+            <a:ext cx="3348000" cy="2832840"/>
           </a:xfrm>
           <a:prstGeom prst="rect">
             <a:avLst/>
@@ -5759,7 +5748,7 @@
             </a:endParaRPr>
           </a:p>
           <a:p>
-            <a:pPr marL="285840" indent="-283680">
+            <a:pPr marL="285840" indent="-283320">
               <a:lnSpc>
                 <a:spcPct val="100000"/>
               </a:lnSpc>
@@ -5787,7 +5776,7 @@
             </a:endParaRPr>
           </a:p>
           <a:p>
-            <a:pPr marL="285840" indent="-283680">
+            <a:pPr marL="285840" indent="-283320">
               <a:lnSpc>
                 <a:spcPct val="100000"/>
               </a:lnSpc>
@@ -5815,7 +5804,7 @@
             </a:endParaRPr>
           </a:p>
           <a:p>
-            <a:pPr marL="285840" indent="-283680">
+            <a:pPr marL="285840" indent="-283320">
               <a:lnSpc>
                 <a:spcPct val="100000"/>
               </a:lnSpc>
@@ -5843,7 +5832,7 @@
             </a:endParaRPr>
           </a:p>
           <a:p>
-            <a:pPr marL="285840" indent="-283680">
+            <a:pPr marL="285840" indent="-283320">
               <a:lnSpc>
                 <a:spcPct val="100000"/>
               </a:lnSpc>
@@ -5871,7 +5860,7 @@
             </a:endParaRPr>
           </a:p>
           <a:p>
-            <a:pPr marL="285840" indent="-283680">
+            <a:pPr marL="285840" indent="-283320">
               <a:lnSpc>
                 <a:spcPct val="100000"/>
               </a:lnSpc>
@@ -5948,7 +5937,7 @@
         <p:spPr>
           <a:xfrm>
             <a:off x="4833360" y="6238080"/>
-            <a:ext cx="2524680" cy="471960"/>
+            <a:ext cx="2524320" cy="471600"/>
           </a:xfrm>
           <a:prstGeom prst="rect">
             <a:avLst/>
@@ -6063,6 +6052,268 @@
           <p:childTnLst>
             <p:seq>
               <p:cTn id="20" dur="indefinite" nodeType="mainSeq"/>
+              <p:prevCondLst>
+                <p:cond delay="0" evt="onPrev">
+                  <p:tgtEl>
+                    <p:sldTgt/>
+                  </p:tgtEl>
+                </p:cond>
+              </p:prevCondLst>
+              <p:nextCondLst>
+                <p:cond delay="0" evt="onNext">
+                  <p:tgtEl>
+                    <p:sldTgt/>
+                  </p:tgtEl>
+                </p:cond>
+              </p:nextCondLst>
+            </p:seq>
+          </p:childTnLst>
+        </p:cTn>
+      </p:par>
+    </p:tnLst>
+  </p:timing>
+</p:sld>
+</file>
+
+<file path=ppt/slides/slide11.xml><?xml version="1.0" encoding="utf-8"?>
+<p:sld xmlns:a="http://schemas.openxmlformats.org/drawingml/2006/main" xmlns:p="http://schemas.openxmlformats.org/presentationml/2006/main" xmlns:r="http://schemas.openxmlformats.org/officeDocument/2006/relationships" xmlns:p14="http://schemas.microsoft.com/office/powerpoint/2010/main" xmlns:p15="http://schemas.microsoft.com/office/powerpoint/2012/main" xmlns:mc="http://schemas.openxmlformats.org/markup-compatibility/2006">
+  <p:cSld>
+    <p:spTree>
+      <p:nvGrpSpPr>
+        <p:cNvPr id="1" name=""/>
+        <p:cNvGrpSpPr/>
+        <p:nvPr/>
+      </p:nvGrpSpPr>
+      <p:grpSpPr>
+        <a:xfrm>
+          <a:off x="0" y="0"/>
+          <a:ext cx="0" cy="0"/>
+          <a:chOff x="0" y="0"/>
+          <a:chExt cx="0" cy="0"/>
+        </a:xfrm>
+      </p:grpSpPr>
+      <p:pic>
+        <p:nvPicPr>
+          <p:cNvPr id="207" name="Picture 6" descr=""/>
+          <p:cNvPicPr/>
+          <p:nvPr/>
+        </p:nvPicPr>
+        <p:blipFill>
+          <a:blip r:embed="rId1"/>
+          <a:stretch/>
+        </p:blipFill>
+        <p:spPr>
+          <a:xfrm>
+            <a:off x="388440" y="333720"/>
+            <a:ext cx="1359720" cy="359280"/>
+          </a:xfrm>
+          <a:prstGeom prst="rect">
+            <a:avLst/>
+          </a:prstGeom>
+          <a:ln>
+            <a:noFill/>
+          </a:ln>
+        </p:spPr>
+      </p:pic>
+      <p:pic>
+        <p:nvPicPr>
+          <p:cNvPr id="208" name="Picture 6" descr=""/>
+          <p:cNvPicPr/>
+          <p:nvPr/>
+        </p:nvPicPr>
+        <p:blipFill>
+          <a:blip r:embed="rId2"/>
+          <a:stretch/>
+        </p:blipFill>
+        <p:spPr>
+          <a:xfrm>
+            <a:off x="10336680" y="334800"/>
+            <a:ext cx="985320" cy="1273320"/>
+          </a:xfrm>
+          <a:prstGeom prst="rect">
+            <a:avLst/>
+          </a:prstGeom>
+          <a:ln>
+            <a:noFill/>
+          </a:ln>
+        </p:spPr>
+      </p:pic>
+      <p:sp>
+        <p:nvSpPr>
+          <p:cNvPr id="209" name="CustomShape 1"/>
+          <p:cNvSpPr/>
+          <p:nvPr/>
+        </p:nvSpPr>
+        <p:spPr>
+          <a:xfrm>
+            <a:off x="4833360" y="6238080"/>
+            <a:ext cx="2524320" cy="471600"/>
+          </a:xfrm>
+          <a:prstGeom prst="rect">
+            <a:avLst/>
+          </a:prstGeom>
+          <a:noFill/>
+          <a:ln>
+            <a:noFill/>
+          </a:ln>
+        </p:spPr>
+        <p:style>
+          <a:lnRef idx="0"/>
+          <a:fillRef idx="0"/>
+          <a:effectRef idx="0"/>
+          <a:fontRef idx="minor"/>
+        </p:style>
+        <p:txBody>
+          <a:bodyPr lIns="90000" rIns="90000" tIns="45000" bIns="45000"/>
+          <a:p>
+            <a:pPr algn="ctr">
+              <a:lnSpc>
+                <a:spcPct val="90000"/>
+              </a:lnSpc>
+              <a:spcBef>
+                <a:spcPts val="1001"/>
+              </a:spcBef>
+            </a:pPr>
+            <a:r>
+              <a:rPr b="1" lang="en-GB" sz="1400" spc="-1" strike="noStrike">
+                <a:solidFill>
+                  <a:srgbClr val="002060"/>
+                </a:solidFill>
+                <a:latin typeface="Arial"/>
+                <a:ea typeface="Calibri"/>
+              </a:rPr>
+              <a:t>ICL-</a:t>
+            </a:r>
+            <a:r>
+              <a:rPr b="1" lang="en-GB" sz="1400" spc="-1" strike="noStrike">
+                <a:solidFill>
+                  <a:srgbClr val="0070c0"/>
+                </a:solidFill>
+                <a:latin typeface="Arial"/>
+                <a:ea typeface="Calibri"/>
+              </a:rPr>
+              <a:t>ICAM</a:t>
+            </a:r>
+            <a:r>
+              <a:rPr b="1" lang="en-GB" sz="1400" spc="-1" strike="noStrike">
+                <a:solidFill>
+                  <a:srgbClr val="002060"/>
+                </a:solidFill>
+                <a:latin typeface="Arial"/>
+                <a:ea typeface="Calibri"/>
+              </a:rPr>
+              <a:t>-BP</a:t>
+            </a:r>
+            <a:endParaRPr b="0" lang="en-GB" sz="1400" spc="-1" strike="noStrike">
+              <a:latin typeface="Arial"/>
+            </a:endParaRPr>
+          </a:p>
+          <a:p>
+            <a:pPr algn="ctr">
+              <a:lnSpc>
+                <a:spcPct val="90000"/>
+              </a:lnSpc>
+              <a:spcBef>
+                <a:spcPts val="1001"/>
+              </a:spcBef>
+            </a:pPr>
+            <a:r>
+              <a:rPr b="0" lang="en-GB" sz="1400" spc="-1" strike="noStrike">
+                <a:solidFill>
+                  <a:srgbClr val="000000"/>
+                </a:solidFill>
+                <a:latin typeface="Arial"/>
+                <a:ea typeface="Calibri"/>
+              </a:rPr>
+              <a:t>24</a:t>
+            </a:r>
+            <a:r>
+              <a:rPr b="0" lang="en-GB" sz="1400" spc="-1" strike="noStrike" baseline="30000">
+                <a:solidFill>
+                  <a:srgbClr val="000000"/>
+                </a:solidFill>
+                <a:latin typeface="Arial"/>
+                <a:ea typeface="Calibri"/>
+              </a:rPr>
+              <a:t>th</a:t>
+            </a:r>
+            <a:r>
+              <a:rPr b="0" lang="en-GB" sz="1400" spc="-1" strike="noStrike">
+                <a:solidFill>
+                  <a:srgbClr val="000000"/>
+                </a:solidFill>
+                <a:latin typeface="Arial"/>
+                <a:ea typeface="Calibri"/>
+              </a:rPr>
+              <a:t> March 2021</a:t>
+            </a:r>
+            <a:endParaRPr b="0" lang="en-GB" sz="1400" spc="-1" strike="noStrike">
+              <a:latin typeface="Arial"/>
+            </a:endParaRPr>
+          </a:p>
+        </p:txBody>
+      </p:sp>
+      <p:sp>
+        <p:nvSpPr>
+          <p:cNvPr id="210" name="CustomShape 2"/>
+          <p:cNvSpPr/>
+          <p:nvPr/>
+        </p:nvSpPr>
+        <p:spPr>
+          <a:xfrm>
+            <a:off x="5614920" y="3130200"/>
+            <a:ext cx="961560" cy="597600"/>
+          </a:xfrm>
+          <a:prstGeom prst="rect">
+            <a:avLst/>
+          </a:prstGeom>
+          <a:noFill/>
+          <a:ln>
+            <a:noFill/>
+          </a:ln>
+        </p:spPr>
+        <p:style>
+          <a:lnRef idx="0"/>
+          <a:fillRef idx="0"/>
+          <a:effectRef idx="0"/>
+          <a:fontRef idx="minor"/>
+        </p:style>
+        <p:txBody>
+          <a:bodyPr lIns="90000" rIns="90000" tIns="45000" bIns="45000"/>
+          <a:p>
+            <a:pPr>
+              <a:lnSpc>
+                <a:spcPct val="100000"/>
+              </a:lnSpc>
+              <a:spcAft>
+                <a:spcPts val="567"/>
+              </a:spcAft>
+            </a:pPr>
+            <a:r>
+              <a:rPr b="1" lang="en-GB" sz="2800" spc="-1" strike="noStrike">
+                <a:solidFill>
+                  <a:srgbClr val="000000"/>
+                </a:solidFill>
+                <a:latin typeface="Arial"/>
+                <a:ea typeface="Calibri"/>
+              </a:rPr>
+              <a:t>END</a:t>
+            </a:r>
+            <a:endParaRPr b="0" lang="en-GB" sz="2800" spc="-1" strike="noStrike">
+              <a:latin typeface="Arial"/>
+            </a:endParaRPr>
+          </a:p>
+        </p:txBody>
+      </p:sp>
+    </p:spTree>
+  </p:cSld>
+  <p:timing>
+    <p:tnLst>
+      <p:par>
+        <p:cTn id="21" dur="indefinite" restart="never" nodeType="tmRoot">
+          <p:childTnLst>
+            <p:seq>
+              <p:cTn id="22" dur="indefinite" nodeType="mainSeq"/>
               <p:prevCondLst>
                 <p:cond delay="0" evt="onPrev">
                   <p:tgtEl>
@@ -6116,7 +6367,7 @@
         <p:spPr>
           <a:xfrm>
             <a:off x="10336680" y="334800"/>
-            <a:ext cx="985680" cy="1273680"/>
+            <a:ext cx="985320" cy="1273320"/>
           </a:xfrm>
           <a:prstGeom prst="rect">
             <a:avLst/>
@@ -6139,7 +6390,7 @@
         <p:spPr>
           <a:xfrm>
             <a:off x="388440" y="333720"/>
-            <a:ext cx="1360080" cy="359640"/>
+            <a:ext cx="1359720" cy="359280"/>
           </a:xfrm>
           <a:prstGeom prst="rect">
             <a:avLst/>
@@ -6158,7 +6409,7 @@
         <p:spPr>
           <a:xfrm>
             <a:off x="875880" y="827640"/>
-            <a:ext cx="9232560" cy="1116000"/>
+            <a:ext cx="9232200" cy="1115640"/>
           </a:xfrm>
           <a:prstGeom prst="rect">
             <a:avLst/>
@@ -6211,7 +6462,7 @@
         <p:spPr>
           <a:xfrm>
             <a:off x="7357320" y="2428200"/>
-            <a:ext cx="3985200" cy="2421720"/>
+            <a:ext cx="3984840" cy="2421360"/>
           </a:xfrm>
           <a:prstGeom prst="rect">
             <a:avLst/>
@@ -6230,7 +6481,7 @@
         <p:spPr>
           <a:xfrm>
             <a:off x="4281120" y="4844160"/>
-            <a:ext cx="2700360" cy="302760"/>
+            <a:ext cx="2700000" cy="302400"/>
           </a:xfrm>
           <a:prstGeom prst="rect">
             <a:avLst/>
@@ -6262,7 +6513,7 @@
                 <a:latin typeface="Calibri"/>
                 <a:ea typeface="DejaVu Sans"/>
               </a:rPr>
-              <a:t>Figure 1. Semi-structured mesh</a:t>
+              <a:t>Figure 1. Semi-structured mesh.</a:t>
             </a:r>
             <a:endParaRPr b="0" lang="en-GB" sz="1200" spc="-1" strike="noStrike">
               <a:latin typeface="Arial"/>
@@ -6279,7 +6530,7 @@
         <p:spPr>
           <a:xfrm>
             <a:off x="7272000" y="4848840"/>
-            <a:ext cx="3670920" cy="334080"/>
+            <a:ext cx="3816000" cy="333720"/>
           </a:xfrm>
           <a:prstGeom prst="rect">
             <a:avLst/>
@@ -6311,7 +6562,7 @@
                 <a:latin typeface="Calibri"/>
                 <a:ea typeface="DejaVu Sans"/>
               </a:rPr>
-              <a:t>Figure 2. Creation and dispersion of a droplet</a:t>
+              <a:t>Figure 2. Creation and dispersion of a droplet.</a:t>
             </a:r>
             <a:endParaRPr b="0" lang="en-GB" sz="1200" spc="-1" strike="noStrike">
               <a:latin typeface="Arial"/>
@@ -6334,7 +6585,7 @@
         <p:spPr>
           <a:xfrm>
             <a:off x="4407840" y="2196000"/>
-            <a:ext cx="2319480" cy="2591640"/>
+            <a:ext cx="2319120" cy="2591280"/>
           </a:xfrm>
           <a:prstGeom prst="rect">
             <a:avLst/>
@@ -6353,7 +6604,7 @@
         <p:spPr>
           <a:xfrm>
             <a:off x="504000" y="2144160"/>
-            <a:ext cx="3311640" cy="303480"/>
+            <a:ext cx="3311280" cy="303120"/>
           </a:xfrm>
           <a:prstGeom prst="rect">
             <a:avLst/>
@@ -6412,7 +6663,7 @@
         <p:spPr>
           <a:xfrm>
             <a:off x="4833360" y="6238080"/>
-            <a:ext cx="2524680" cy="471960"/>
+            <a:ext cx="2524320" cy="471600"/>
           </a:xfrm>
           <a:prstGeom prst="rect">
             <a:avLst/>
@@ -6527,7 +6778,7 @@
         <p:spPr>
           <a:xfrm>
             <a:off x="504000" y="2540160"/>
-            <a:ext cx="3311640" cy="1347480"/>
+            <a:ext cx="3311280" cy="1347120"/>
           </a:xfrm>
           <a:prstGeom prst="rect">
             <a:avLst/>
@@ -6649,7 +6900,7 @@
         <p:spPr>
           <a:xfrm>
             <a:off x="10336680" y="334800"/>
-            <a:ext cx="985680" cy="1273680"/>
+            <a:ext cx="985320" cy="1273320"/>
           </a:xfrm>
           <a:prstGeom prst="rect">
             <a:avLst/>
@@ -6672,7 +6923,7 @@
         <p:spPr>
           <a:xfrm>
             <a:off x="388440" y="333720"/>
-            <a:ext cx="1360080" cy="359640"/>
+            <a:ext cx="1359720" cy="359280"/>
           </a:xfrm>
           <a:prstGeom prst="rect">
             <a:avLst/>
@@ -6691,7 +6942,7 @@
         <p:spPr>
           <a:xfrm>
             <a:off x="504000" y="1244160"/>
-            <a:ext cx="3311640" cy="303480"/>
+            <a:ext cx="3311280" cy="303120"/>
           </a:xfrm>
           <a:prstGeom prst="rect">
             <a:avLst/>
@@ -6750,7 +7001,7 @@
         <p:spPr>
           <a:xfrm>
             <a:off x="4833360" y="6238080"/>
-            <a:ext cx="2524680" cy="471960"/>
+            <a:ext cx="2524320" cy="471600"/>
           </a:xfrm>
           <a:prstGeom prst="rect">
             <a:avLst/>
@@ -6869,7 +7120,7 @@
         <p:spPr>
           <a:xfrm>
             <a:off x="1352520" y="365040"/>
-            <a:ext cx="9486360" cy="5335560"/>
+            <a:ext cx="9486000" cy="5335200"/>
           </a:xfrm>
           <a:prstGeom prst="rect">
             <a:avLst/>
@@ -6888,7 +7139,7 @@
         <p:spPr>
           <a:xfrm>
             <a:off x="4021200" y="5265000"/>
-            <a:ext cx="4148640" cy="273960"/>
+            <a:ext cx="4148280" cy="273600"/>
           </a:xfrm>
           <a:prstGeom prst="rect">
             <a:avLst/>
@@ -6990,7 +7241,7 @@
         <p:spPr>
           <a:xfrm>
             <a:off x="388440" y="333720"/>
-            <a:ext cx="1360080" cy="359640"/>
+            <a:ext cx="1359720" cy="359280"/>
           </a:xfrm>
           <a:prstGeom prst="rect">
             <a:avLst/>
@@ -7013,7 +7264,7 @@
         <p:spPr>
           <a:xfrm>
             <a:off x="10336680" y="334800"/>
-            <a:ext cx="985680" cy="1273680"/>
+            <a:ext cx="985320" cy="1273320"/>
           </a:xfrm>
           <a:prstGeom prst="rect">
             <a:avLst/>
@@ -7032,7 +7283,7 @@
         <p:spPr>
           <a:xfrm>
             <a:off x="360000" y="1401120"/>
-            <a:ext cx="5038920" cy="541800"/>
+            <a:ext cx="5038560" cy="541440"/>
           </a:xfrm>
           <a:prstGeom prst="rect">
             <a:avLst/>
@@ -7111,7 +7362,7 @@
         <p:spPr>
           <a:xfrm>
             <a:off x="322560" y="1800000"/>
-            <a:ext cx="1260360" cy="430920"/>
+            <a:ext cx="1260000" cy="430560"/>
           </a:xfrm>
           <a:prstGeom prst="rect">
             <a:avLst/>
@@ -7200,7 +7451,7 @@
         <p:spPr>
           <a:xfrm>
             <a:off x="5760000" y="1800000"/>
-            <a:ext cx="1260360" cy="430920"/>
+            <a:ext cx="1260000" cy="430560"/>
           </a:xfrm>
           <a:prstGeom prst="rect">
             <a:avLst/>
@@ -7283,7 +7534,7 @@
         <p:spPr>
           <a:xfrm>
             <a:off x="7344000" y="1728000"/>
-            <a:ext cx="4017600" cy="4390920"/>
+            <a:ext cx="4017240" cy="4390560"/>
           </a:xfrm>
           <a:prstGeom prst="rect">
             <a:avLst/>
@@ -7302,7 +7553,7 @@
         <p:spPr>
           <a:xfrm flipH="1">
             <a:off x="5899320" y="2491920"/>
-            <a:ext cx="9000" cy="2895120"/>
+            <a:ext cx="8640" cy="2894760"/>
           </a:xfrm>
           <a:custGeom>
             <a:avLst/>
@@ -7326,7 +7577,7 @@
               <a:srgbClr val="0066b3"/>
             </a:solidFill>
             <a:custDash>
-              <a:ds d="1200000" sp="1200000"/>
+              <a:ds d="1500000" sp="1500000"/>
             </a:custDash>
             <a:round/>
           </a:ln>
@@ -7347,9 +7598,9 @@
         <p:grpSpPr>
           <a:xfrm>
             <a:off x="1440000" y="1872000"/>
-            <a:ext cx="3958920" cy="4030560"/>
+            <a:ext cx="3958560" cy="4030200"/>
             <a:chOff x="1440000" y="1872000"/>
-            <a:chExt cx="3958920" cy="4030560"/>
+            <a:chExt cx="3958560" cy="4030200"/>
           </a:xfrm>
         </p:grpSpPr>
         <p:pic>
@@ -7366,7 +7617,7 @@
           <p:spPr>
             <a:xfrm>
               <a:off x="1440000" y="1872000"/>
-              <a:ext cx="3958920" cy="4030560"/>
+              <a:ext cx="3958560" cy="4030200"/>
             </a:xfrm>
             <a:prstGeom prst="rect">
               <a:avLst/>
@@ -7389,7 +7640,7 @@
           <p:spPr>
             <a:xfrm>
               <a:off x="2880000" y="5400000"/>
-              <a:ext cx="1366920" cy="377640"/>
+              <a:ext cx="1366560" cy="377280"/>
             </a:xfrm>
             <a:prstGeom prst="rect">
               <a:avLst/>
@@ -7409,7 +7660,7 @@
         <p:spPr>
           <a:xfrm>
             <a:off x="4833360" y="6238080"/>
-            <a:ext cx="2524680" cy="471960"/>
+            <a:ext cx="2524320" cy="471600"/>
           </a:xfrm>
           <a:prstGeom prst="rect">
             <a:avLst/>
@@ -7577,7 +7828,7 @@
         <p:spPr>
           <a:xfrm>
             <a:off x="1164960" y="591840"/>
-            <a:ext cx="4522680" cy="5470920"/>
+            <a:ext cx="4522320" cy="5470560"/>
           </a:xfrm>
           <a:prstGeom prst="rect">
             <a:avLst/>
@@ -7600,7 +7851,7 @@
         <p:spPr>
           <a:xfrm>
             <a:off x="388440" y="333720"/>
-            <a:ext cx="1360080" cy="359640"/>
+            <a:ext cx="1359720" cy="359280"/>
           </a:xfrm>
           <a:prstGeom prst="rect">
             <a:avLst/>
@@ -7623,7 +7874,7 @@
         <p:spPr>
           <a:xfrm>
             <a:off x="10336680" y="334800"/>
-            <a:ext cx="985680" cy="1273680"/>
+            <a:ext cx="985320" cy="1273320"/>
           </a:xfrm>
           <a:prstGeom prst="rect">
             <a:avLst/>
@@ -7642,7 +7893,7 @@
         <p:spPr>
           <a:xfrm>
             <a:off x="5934240" y="6192000"/>
-            <a:ext cx="2524680" cy="471960"/>
+            <a:ext cx="2524320" cy="471600"/>
           </a:xfrm>
           <a:prstGeom prst="rect">
             <a:avLst/>
@@ -7761,7 +8012,7 @@
         <p:spPr>
           <a:xfrm>
             <a:off x="6966720" y="1633680"/>
-            <a:ext cx="3868920" cy="2901240"/>
+            <a:ext cx="3868560" cy="2900880"/>
           </a:xfrm>
           <a:prstGeom prst="rect">
             <a:avLst/>
@@ -7780,7 +8031,7 @@
         <p:spPr>
           <a:xfrm>
             <a:off x="6427440" y="4549320"/>
-            <a:ext cx="4947480" cy="345600"/>
+            <a:ext cx="4947120" cy="345240"/>
           </a:xfrm>
           <a:prstGeom prst="rect">
             <a:avLst/>
@@ -7829,7 +8080,7 @@
         <p:spPr>
           <a:xfrm>
             <a:off x="1338480" y="6133320"/>
-            <a:ext cx="4175280" cy="345600"/>
+            <a:ext cx="4174920" cy="345240"/>
           </a:xfrm>
           <a:prstGeom prst="rect">
             <a:avLst/>
@@ -7864,7 +8115,7 @@
               <a:t>Figure 4. Flowchart for the DG Petrov-Galerkin diffusion method.</a:t>
             </a:r>
             <a:endParaRPr b="0" lang="en-GB" sz="1800" spc="-1" strike="noStrike">
-              <a:latin typeface="arial"/>
+              <a:latin typeface="Arial"/>
             </a:endParaRPr>
           </a:p>
         </p:txBody>
@@ -7931,7 +8182,7 @@
         <p:spPr>
           <a:xfrm>
             <a:off x="388440" y="333720"/>
-            <a:ext cx="1360080" cy="359640"/>
+            <a:ext cx="1359720" cy="359280"/>
           </a:xfrm>
           <a:prstGeom prst="rect">
             <a:avLst/>
@@ -7950,7 +8201,7 @@
         <p:spPr>
           <a:xfrm>
             <a:off x="648000" y="1044000"/>
-            <a:ext cx="1196280" cy="358560"/>
+            <a:ext cx="1195920" cy="358200"/>
           </a:xfrm>
           <a:prstGeom prst="rect">
             <a:avLst/>
@@ -8013,7 +8264,7 @@
         <p:spPr>
           <a:xfrm>
             <a:off x="10336680" y="334800"/>
-            <a:ext cx="985680" cy="1273680"/>
+            <a:ext cx="985320" cy="1273320"/>
           </a:xfrm>
           <a:prstGeom prst="rect">
             <a:avLst/>
@@ -8036,7 +8287,7 @@
         <p:spPr>
           <a:xfrm>
             <a:off x="3420000" y="890280"/>
-            <a:ext cx="4174920" cy="1880640"/>
+            <a:ext cx="4174560" cy="1880280"/>
           </a:xfrm>
           <a:prstGeom prst="rect">
             <a:avLst/>
@@ -8055,7 +8306,7 @@
         <p:spPr>
           <a:xfrm>
             <a:off x="648000" y="2952000"/>
-            <a:ext cx="1727640" cy="358560"/>
+            <a:ext cx="1727280" cy="358200"/>
           </a:xfrm>
           <a:prstGeom prst="rect">
             <a:avLst/>
@@ -8118,7 +8369,7 @@
         <p:spPr>
           <a:xfrm>
             <a:off x="731160" y="3420000"/>
-            <a:ext cx="3128400" cy="2385720"/>
+            <a:ext cx="3128040" cy="2385360"/>
           </a:xfrm>
           <a:prstGeom prst="rect">
             <a:avLst/>
@@ -8141,7 +8392,7 @@
         <p:spPr>
           <a:xfrm>
             <a:off x="5112000" y="3420000"/>
-            <a:ext cx="1979640" cy="1942920"/>
+            <a:ext cx="1979280" cy="1942560"/>
           </a:xfrm>
           <a:prstGeom prst="rect">
             <a:avLst/>
@@ -8164,7 +8415,7 @@
         <p:spPr>
           <a:xfrm>
             <a:off x="8836920" y="3420000"/>
-            <a:ext cx="2414520" cy="1222920"/>
+            <a:ext cx="2414160" cy="1222560"/>
           </a:xfrm>
           <a:prstGeom prst="rect">
             <a:avLst/>
@@ -8183,7 +8434,7 @@
         <p:spPr>
           <a:xfrm>
             <a:off x="897480" y="5832000"/>
-            <a:ext cx="2795760" cy="286920"/>
+            <a:ext cx="2795400" cy="286560"/>
           </a:xfrm>
           <a:prstGeom prst="rect">
             <a:avLst/>
@@ -8215,7 +8466,7 @@
                 <a:latin typeface="Arial"/>
                 <a:ea typeface="DejaVu Sans"/>
               </a:rPr>
-              <a:t>Figure 7. 2D domain with local &amp; global node numbering</a:t>
+              <a:t>Figure 7. 2D domain with local &amp; global node numbering.</a:t>
             </a:r>
             <a:endParaRPr b="0" lang="en-GB" sz="1100" spc="-1" strike="noStrike">
               <a:latin typeface="Arial"/>
@@ -8232,7 +8483,7 @@
         <p:spPr>
           <a:xfrm>
             <a:off x="4644000" y="5580000"/>
-            <a:ext cx="3420000" cy="231120"/>
+            <a:ext cx="3419640" cy="230760"/>
           </a:xfrm>
           <a:prstGeom prst="rect">
             <a:avLst/>
@@ -8264,7 +8515,7 @@
                 <a:latin typeface="Arial"/>
                 <a:ea typeface="DejaVu Sans"/>
               </a:rPr>
-              <a:t>Figure 8. Volume integral using 3-0point Gaussian quadrature method</a:t>
+              <a:t>Figure 8. Volume integration using 3-point Gaussian quadrature method.</a:t>
             </a:r>
             <a:endParaRPr b="0" lang="en-GB" sz="1100" spc="-1" strike="noStrike">
               <a:latin typeface="Arial"/>
@@ -8281,7 +8532,7 @@
         <p:spPr>
           <a:xfrm>
             <a:off x="8640000" y="4881960"/>
-            <a:ext cx="2808000" cy="372960"/>
+            <a:ext cx="2807640" cy="372600"/>
           </a:xfrm>
           <a:prstGeom prst="rect">
             <a:avLst/>
@@ -8313,7 +8564,7 @@
                 <a:latin typeface="Arial"/>
                 <a:ea typeface="DejaVu Sans"/>
               </a:rPr>
-              <a:t>Figure 9. Surface integral using 2-point Gaussian quadrature method</a:t>
+              <a:t>Figure 9. Surface integration using 2-point Gaussian quadrature method.</a:t>
             </a:r>
             <a:endParaRPr b="0" lang="en-GB" sz="1100" spc="-1" strike="noStrike">
               <a:latin typeface="Arial"/>
@@ -8330,7 +8581,7 @@
         <p:spPr>
           <a:xfrm>
             <a:off x="4833360" y="6238080"/>
-            <a:ext cx="2524680" cy="471960"/>
+            <a:ext cx="2524320" cy="471600"/>
           </a:xfrm>
           <a:prstGeom prst="rect">
             <a:avLst/>
@@ -8445,7 +8696,7 @@
         <p:spPr>
           <a:xfrm>
             <a:off x="3677760" y="2880000"/>
-            <a:ext cx="3954240" cy="286920"/>
+            <a:ext cx="3953880" cy="286560"/>
           </a:xfrm>
           <a:prstGeom prst="rect">
             <a:avLst/>
@@ -8547,7 +8798,7 @@
         <p:spPr>
           <a:xfrm>
             <a:off x="388440" y="333720"/>
-            <a:ext cx="1360080" cy="359640"/>
+            <a:ext cx="1359720" cy="359280"/>
           </a:xfrm>
           <a:prstGeom prst="rect">
             <a:avLst/>
@@ -8570,7 +8821,7 @@
         <p:spPr>
           <a:xfrm>
             <a:off x="10336680" y="334800"/>
-            <a:ext cx="985680" cy="1273680"/>
+            <a:ext cx="985320" cy="1273320"/>
           </a:xfrm>
           <a:prstGeom prst="rect">
             <a:avLst/>
@@ -8589,7 +8840,7 @@
         <p:spPr>
           <a:xfrm>
             <a:off x="792000" y="1440000"/>
-            <a:ext cx="5902920" cy="358560"/>
+            <a:ext cx="5902560" cy="358200"/>
           </a:xfrm>
           <a:prstGeom prst="rect">
             <a:avLst/>
@@ -8688,7 +8939,7 @@
         <p:spPr>
           <a:xfrm>
             <a:off x="394920" y="1882800"/>
-            <a:ext cx="11466360" cy="1018080"/>
+            <a:ext cx="11466000" cy="1017720"/>
           </a:xfrm>
           <a:prstGeom prst="rect">
             <a:avLst/>
@@ -8707,7 +8958,7 @@
         <p:txBody>
           <a:bodyPr lIns="90000" rIns="90000" tIns="45000" bIns="45000"/>
           <a:p>
-            <a:pPr marL="216000" indent="-214920">
+            <a:pPr marL="216000" indent="-214560">
               <a:lnSpc>
                 <a:spcPct val="115000"/>
               </a:lnSpc>
@@ -8736,7 +8987,7 @@
             </a:endParaRPr>
           </a:p>
           <a:p>
-            <a:pPr marL="216000" indent="-214920">
+            <a:pPr marL="216000" indent="-214560">
               <a:lnSpc>
                 <a:spcPct val="115000"/>
               </a:lnSpc>
@@ -8765,7 +9016,7 @@
             </a:endParaRPr>
           </a:p>
           <a:p>
-            <a:pPr marL="216000" indent="-214920">
+            <a:pPr marL="216000" indent="-214560">
               <a:lnSpc>
                 <a:spcPct val="115000"/>
               </a:lnSpc>
@@ -8803,13 +9054,13 @@
         </p:nvPicPr>
         <p:blipFill>
           <a:blip r:embed="rId3"/>
-          <a:srcRect l="8237" t="28138" r="0" b="0"/>
+          <a:srcRect l="8237" t="28132" r="0" b="0"/>
           <a:stretch/>
         </p:blipFill>
         <p:spPr>
           <a:xfrm>
             <a:off x="576000" y="3324600"/>
-            <a:ext cx="4894920" cy="1510920"/>
+            <a:ext cx="4894560" cy="1510560"/>
           </a:xfrm>
           <a:prstGeom prst="rect">
             <a:avLst/>
@@ -8827,13 +9078,13 @@
         </p:nvPicPr>
         <p:blipFill>
           <a:blip r:embed="rId4"/>
-          <a:srcRect l="7606" t="29267" r="0" b="0"/>
+          <a:srcRect l="7606" t="29261" r="0" b="0"/>
           <a:stretch/>
         </p:blipFill>
         <p:spPr>
           <a:xfrm>
             <a:off x="6408000" y="3340800"/>
-            <a:ext cx="4898880" cy="1478520"/>
+            <a:ext cx="4898520" cy="1478160"/>
           </a:xfrm>
           <a:prstGeom prst="rect">
             <a:avLst/>
@@ -8852,7 +9103,7 @@
         <p:spPr>
           <a:xfrm>
             <a:off x="1279800" y="4896000"/>
-            <a:ext cx="3487320" cy="286920"/>
+            <a:ext cx="3486960" cy="286560"/>
           </a:xfrm>
           <a:prstGeom prst="rect">
             <a:avLst/>
@@ -8884,7 +9135,7 @@
                 <a:latin typeface="Arial"/>
                 <a:ea typeface="DejaVu Sans"/>
               </a:rPr>
-              <a:t>Figure 10. Flow pass a cylinder with the fixed mesh</a:t>
+              <a:t>Figure 10. Flow pass a cylinder with the fixed mesh.</a:t>
             </a:r>
             <a:endParaRPr b="0" lang="en-GB" sz="1100" spc="-1" strike="noStrike">
               <a:latin typeface="Arial"/>
@@ -8901,7 +9152,7 @@
         <p:spPr>
           <a:xfrm>
             <a:off x="6959160" y="4896360"/>
-            <a:ext cx="3796920" cy="286560"/>
+            <a:ext cx="3796560" cy="286200"/>
           </a:xfrm>
           <a:prstGeom prst="rect">
             <a:avLst/>
@@ -8933,7 +9184,7 @@
                 <a:latin typeface="Arial"/>
                 <a:ea typeface="DejaVu Sans"/>
               </a:rPr>
-              <a:t>Figure 11. Flow pass a cylinder with the adaptive mesh</a:t>
+              <a:t>Figure 11. Flow pass a cylinder with the adaptive mesh.</a:t>
             </a:r>
             <a:endParaRPr b="0" lang="en-GB" sz="1100" spc="-1" strike="noStrike">
               <a:latin typeface="Arial"/>
@@ -8950,7 +9201,7 @@
         <p:spPr>
           <a:xfrm>
             <a:off x="4833360" y="6238080"/>
-            <a:ext cx="2524680" cy="471960"/>
+            <a:ext cx="2524320" cy="471600"/>
           </a:xfrm>
           <a:prstGeom prst="rect">
             <a:avLst/>
@@ -9065,7 +9316,7 @@
         <p:spPr>
           <a:xfrm>
             <a:off x="1296000" y="5292000"/>
-            <a:ext cx="3455640" cy="1043640"/>
+            <a:ext cx="3455280" cy="1043280"/>
           </a:xfrm>
           <a:prstGeom prst="rect">
             <a:avLst/>
@@ -9196,7 +9447,7 @@
         <p:spPr>
           <a:xfrm>
             <a:off x="7129440" y="5292000"/>
-            <a:ext cx="3455640" cy="1223640"/>
+            <a:ext cx="3455280" cy="1223280"/>
           </a:xfrm>
           <a:prstGeom prst="rect">
             <a:avLst/>
@@ -9400,7 +9651,7 @@
         <p:spPr>
           <a:xfrm>
             <a:off x="388440" y="333720"/>
-            <a:ext cx="1360080" cy="359640"/>
+            <a:ext cx="1359720" cy="359280"/>
           </a:xfrm>
           <a:prstGeom prst="rect">
             <a:avLst/>
@@ -9423,7 +9674,7 @@
         <p:spPr>
           <a:xfrm>
             <a:off x="10336680" y="334800"/>
-            <a:ext cx="985680" cy="1273680"/>
+            <a:ext cx="985320" cy="1273320"/>
           </a:xfrm>
           <a:prstGeom prst="rect">
             <a:avLst/>
@@ -9442,7 +9693,7 @@
         <p:spPr>
           <a:xfrm>
             <a:off x="792000" y="1440000"/>
-            <a:ext cx="5902920" cy="358560"/>
+            <a:ext cx="5902560" cy="358200"/>
           </a:xfrm>
           <a:prstGeom prst="rect">
             <a:avLst/>
@@ -9541,7 +9792,7 @@
         <p:spPr>
           <a:xfrm>
             <a:off x="394920" y="1882800"/>
-            <a:ext cx="11466360" cy="1018080"/>
+            <a:ext cx="11466000" cy="1017720"/>
           </a:xfrm>
           <a:prstGeom prst="rect">
             <a:avLst/>
@@ -9560,7 +9811,7 @@
         <p:txBody>
           <a:bodyPr lIns="90000" rIns="90000" tIns="45000" bIns="45000"/>
           <a:p>
-            <a:pPr marL="216000" indent="-214920">
+            <a:pPr marL="216000" indent="-214560">
               <a:lnSpc>
                 <a:spcPct val="115000"/>
               </a:lnSpc>
@@ -9589,7 +9840,7 @@
             </a:endParaRPr>
           </a:p>
           <a:p>
-            <a:pPr marL="216000" indent="-214920">
+            <a:pPr marL="216000" indent="-214560">
               <a:lnSpc>
                 <a:spcPct val="115000"/>
               </a:lnSpc>
@@ -9618,7 +9869,7 @@
             </a:endParaRPr>
           </a:p>
           <a:p>
-            <a:pPr marL="216000" indent="-214920">
+            <a:pPr marL="216000" indent="-214560">
               <a:lnSpc>
                 <a:spcPct val="115000"/>
               </a:lnSpc>
@@ -9656,13 +9907,13 @@
         </p:nvPicPr>
         <p:blipFill>
           <a:blip r:embed="rId3"/>
-          <a:srcRect l="28657" t="0" r="28208" b="0"/>
+          <a:srcRect l="28652" t="0" r="28205" b="0"/>
           <a:stretch/>
         </p:blipFill>
         <p:spPr>
           <a:xfrm>
             <a:off x="2756160" y="3149640"/>
-            <a:ext cx="2282760" cy="2086920"/>
+            <a:ext cx="2282400" cy="2086560"/>
           </a:xfrm>
           <a:prstGeom prst="rect">
             <a:avLst/>
@@ -9680,13 +9931,13 @@
         </p:nvPicPr>
         <p:blipFill>
           <a:blip r:embed="rId4"/>
-          <a:srcRect l="28657" t="0" r="28208" b="0"/>
+          <a:srcRect l="28652" t="0" r="28205" b="0"/>
           <a:stretch/>
         </p:blipFill>
         <p:spPr>
           <a:xfrm>
             <a:off x="432000" y="3149640"/>
-            <a:ext cx="2302920" cy="2105280"/>
+            <a:ext cx="2302560" cy="2104920"/>
           </a:xfrm>
           <a:prstGeom prst="rect">
             <a:avLst/>
@@ -9704,13 +9955,13 @@
         </p:nvPicPr>
         <p:blipFill>
           <a:blip r:embed="rId5"/>
-          <a:srcRect l="28529" t="0" r="28339" b="0"/>
+          <a:srcRect l="28525" t="0" r="28335" b="0"/>
           <a:stretch/>
         </p:blipFill>
         <p:spPr>
           <a:xfrm>
             <a:off x="5724000" y="3168000"/>
-            <a:ext cx="2948760" cy="2079720"/>
+            <a:ext cx="2948400" cy="2079360"/>
           </a:xfrm>
           <a:prstGeom prst="rect">
             <a:avLst/>
@@ -9728,13 +9979,13 @@
         </p:nvPicPr>
         <p:blipFill>
           <a:blip r:embed="rId6"/>
-          <a:srcRect l="28063" t="0" r="28213" b="0"/>
+          <a:srcRect l="28060" t="0" r="28210" b="0"/>
           <a:stretch/>
         </p:blipFill>
         <p:spPr>
           <a:xfrm>
             <a:off x="8709840" y="3175200"/>
-            <a:ext cx="2989080" cy="2079720"/>
+            <a:ext cx="2988720" cy="2079360"/>
           </a:xfrm>
           <a:prstGeom prst="rect">
             <a:avLst/>
@@ -9753,7 +10004,7 @@
         <p:spPr>
           <a:xfrm>
             <a:off x="612000" y="5370840"/>
-            <a:ext cx="4392000" cy="345600"/>
+            <a:ext cx="4391640" cy="345240"/>
           </a:xfrm>
           <a:prstGeom prst="rect">
             <a:avLst/>
@@ -9785,7 +10036,7 @@
                 <a:latin typeface="Arial"/>
                 <a:ea typeface="DejaVu Sans"/>
               </a:rPr>
-              <a:t>Figure 12. Collapsing water column under gravity with a fixed mesh</a:t>
+              <a:t>Figure 12. Collapsing water column under gravity with a fixed mesh.</a:t>
             </a:r>
             <a:endParaRPr b="0" lang="en-GB" sz="1100" spc="-1" strike="noStrike">
               <a:latin typeface="Arial"/>
@@ -9802,7 +10053,7 @@
         <p:spPr>
           <a:xfrm>
             <a:off x="6554520" y="5370840"/>
-            <a:ext cx="4785480" cy="372960"/>
+            <a:ext cx="4785120" cy="372600"/>
           </a:xfrm>
           <a:prstGeom prst="rect">
             <a:avLst/>
@@ -9834,7 +10085,7 @@
                 <a:latin typeface="Arial"/>
                 <a:ea typeface="DejaVu Sans"/>
               </a:rPr>
-              <a:t>Figure 13. Collapsing water column under gravity with the adaptive mesh</a:t>
+              <a:t>Figure 13. Collapsing water column under gravity with the adaptive mesh.</a:t>
             </a:r>
             <a:endParaRPr b="0" lang="en-GB" sz="1100" spc="-1" strike="noStrike">
               <a:latin typeface="Arial"/>
@@ -9851,7 +10102,7 @@
         <p:spPr>
           <a:xfrm>
             <a:off x="4833360" y="6238080"/>
-            <a:ext cx="2524680" cy="471960"/>
+            <a:ext cx="2524320" cy="471600"/>
           </a:xfrm>
           <a:prstGeom prst="rect">
             <a:avLst/>
@@ -10019,7 +10270,7 @@
         <p:spPr>
           <a:xfrm>
             <a:off x="388440" y="333720"/>
-            <a:ext cx="1360080" cy="359640"/>
+            <a:ext cx="1359720" cy="359280"/>
           </a:xfrm>
           <a:prstGeom prst="rect">
             <a:avLst/>
@@ -10042,7 +10293,7 @@
         <p:spPr>
           <a:xfrm>
             <a:off x="10336680" y="334800"/>
-            <a:ext cx="985680" cy="1273680"/>
+            <a:ext cx="985320" cy="1273320"/>
           </a:xfrm>
           <a:prstGeom prst="rect">
             <a:avLst/>
@@ -10061,7 +10312,7 @@
         <p:spPr>
           <a:xfrm>
             <a:off x="2952000" y="360000"/>
-            <a:ext cx="3383640" cy="322920"/>
+            <a:ext cx="3383280" cy="322560"/>
           </a:xfrm>
           <a:prstGeom prst="rect">
             <a:avLst/>
@@ -10110,7 +10361,7 @@
         <p:spPr>
           <a:xfrm>
             <a:off x="1827360" y="3420000"/>
-            <a:ext cx="3873600" cy="372960"/>
+            <a:ext cx="3873240" cy="372600"/>
           </a:xfrm>
           <a:prstGeom prst="rect">
             <a:avLst/>
@@ -10142,7 +10393,7 @@
                 <a:latin typeface="Arial"/>
                 <a:ea typeface="DejaVu Sans"/>
               </a:rPr>
-              <a:t>Figure 14.Flow pass in a cylinder in 3D with the adaptive mesh</a:t>
+              <a:t>Figure 14.Flow pass in a cylinder in 3D with the adaptive mesh.</a:t>
             </a:r>
             <a:endParaRPr b="0" lang="en-GB" sz="1000" spc="-1" strike="noStrike">
               <a:latin typeface="Arial"/>
@@ -10159,7 +10410,7 @@
         <p:spPr>
           <a:xfrm>
             <a:off x="9549360" y="6238080"/>
-            <a:ext cx="2524680" cy="471960"/>
+            <a:ext cx="2524320" cy="471600"/>
           </a:xfrm>
           <a:prstGeom prst="rect">
             <a:avLst/>
@@ -10278,7 +10529,7 @@
         <p:spPr>
           <a:xfrm>
             <a:off x="414720" y="812880"/>
-            <a:ext cx="6698880" cy="2642760"/>
+            <a:ext cx="6698520" cy="2642400"/>
           </a:xfrm>
           <a:prstGeom prst="rect">
             <a:avLst/>
@@ -10297,7 +10548,7 @@
         <p:spPr>
           <a:xfrm>
             <a:off x="7236000" y="1701000"/>
-            <a:ext cx="3455640" cy="1223640"/>
+            <a:ext cx="3455280" cy="1223280"/>
           </a:xfrm>
           <a:prstGeom prst="rect">
             <a:avLst/>
@@ -10451,8 +10702,8 @@
         </p:blipFill>
         <p:spPr>
           <a:xfrm rot="30000">
-            <a:off x="393480" y="3745440"/>
-            <a:ext cx="6668280" cy="2630160"/>
+            <a:off x="393120" y="3745080"/>
+            <a:ext cx="6667920" cy="2629800"/>
           </a:xfrm>
           <a:prstGeom prst="rect">
             <a:avLst/>
@@ -10471,7 +10722,7 @@
         <p:spPr>
           <a:xfrm>
             <a:off x="933480" y="6372000"/>
-            <a:ext cx="5588640" cy="372960"/>
+            <a:ext cx="5588280" cy="372600"/>
           </a:xfrm>
           <a:prstGeom prst="rect">
             <a:avLst/>
@@ -10503,7 +10754,7 @@
                 <a:latin typeface="Arial"/>
                 <a:ea typeface="DejaVu Sans"/>
               </a:rPr>
-              <a:t>Figure 15.Sliced mesh view for the flow pass in a cylinder problem in 3D with the adaptive mesh</a:t>
+              <a:t>Figure 15.Sliced mesh view for the flow pass in a cylinder problem in 3D with the adaptive mesh.</a:t>
             </a:r>
             <a:endParaRPr b="0" lang="en-GB" sz="1000" spc="-1" strike="noStrike">
               <a:latin typeface="Arial"/>

</xml_diff>